<commit_message>
Fixed typo + Added pdf.
</commit_message>
<xml_diff>
--- a/Final Presentation.pptx
+++ b/Final Presentation.pptx
@@ -8381,8 +8381,12 @@
           </a:p>
           <a:p>
             <a:r>
+              <a:rPr lang="en-US" sz="2800"/>
+              <a:t>Statistical Anomaly </a:t>
+            </a:r>
+            <a:r>
               <a:rPr lang="en-US" sz="2800" dirty="0"/>
-              <a:t>Statistical Anomy based</a:t>
+              <a:t>based</a:t>
             </a:r>
           </a:p>
           <a:p>

</xml_diff>